<commit_message>
ppt part 1 change
</commit_message>
<xml_diff>
--- a/Project_1.pptx
+++ b/Project_1.pptx
@@ -132,6 +132,127 @@
     </p:ext>
   </p:extLst>
 </p:presentation>
+</file>
+
+<file path=ppt/revisionInfo.xml><?xml version="1.0" encoding="utf-8"?>
+<p1510:revInfo xmlns:a="http://schemas.openxmlformats.org/drawingml/2006/main" xmlns:r="http://schemas.openxmlformats.org/officeDocument/2006/relationships" xmlns:p1510="http://schemas.microsoft.com/office/powerpoint/2015/10/main">
+  <p1510:revLst>
+    <p1510:client id="{5DF33DE7-60B6-4EB2-8509-B6307F7E2722}" v="3" dt="2021-02-23T18:16:28.701"/>
+  </p1510:revLst>
+</p1510:revInfo>
+</file>
+
+<file path=ppt/changesInfos/changesInfo1.xml><?xml version="1.0" encoding="utf-8"?>
+<pc:chgInfo xmlns:a="http://schemas.openxmlformats.org/drawingml/2006/main" xmlns:r="http://schemas.openxmlformats.org/officeDocument/2006/relationships" xmlns:ac="http://schemas.microsoft.com/office/drawing/2013/main/command" xmlns:pc="http://schemas.microsoft.com/office/powerpoint/2013/main/command">
+  <pc:docChgLst>
+    <pc:chgData name="Harrison Terry" userId="63d32b2a3de92b0b" providerId="LiveId" clId="{5DF33DE7-60B6-4EB2-8509-B6307F7E2722}"/>
+    <pc:docChg chg="undo custSel modSld">
+      <pc:chgData name="Harrison Terry" userId="63d32b2a3de92b0b" providerId="LiveId" clId="{5DF33DE7-60B6-4EB2-8509-B6307F7E2722}" dt="2021-02-23T18:19:27.551" v="434" actId="20577"/>
+      <pc:docMkLst>
+        <pc:docMk/>
+      </pc:docMkLst>
+      <pc:sldChg chg="modSp mod">
+        <pc:chgData name="Harrison Terry" userId="63d32b2a3de92b0b" providerId="LiveId" clId="{5DF33DE7-60B6-4EB2-8509-B6307F7E2722}" dt="2021-02-23T18:08:25.061" v="36" actId="20577"/>
+        <pc:sldMkLst>
+          <pc:docMk/>
+          <pc:sldMk cId="2816202944" sldId="256"/>
+        </pc:sldMkLst>
+        <pc:spChg chg="mod">
+          <ac:chgData name="Harrison Terry" userId="63d32b2a3de92b0b" providerId="LiveId" clId="{5DF33DE7-60B6-4EB2-8509-B6307F7E2722}" dt="2021-02-23T18:08:25.061" v="36" actId="20577"/>
+          <ac:spMkLst>
+            <pc:docMk/>
+            <pc:sldMk cId="2816202944" sldId="256"/>
+            <ac:spMk id="2" creationId="{DB7E35B8-F0E6-473E-AA70-CBED5B2ABB95}"/>
+          </ac:spMkLst>
+        </pc:spChg>
+      </pc:sldChg>
+      <pc:sldChg chg="modSp mod">
+        <pc:chgData name="Harrison Terry" userId="63d32b2a3de92b0b" providerId="LiveId" clId="{5DF33DE7-60B6-4EB2-8509-B6307F7E2722}" dt="2021-02-23T18:08:49.030" v="87" actId="27636"/>
+        <pc:sldMkLst>
+          <pc:docMk/>
+          <pc:sldMk cId="3401748718" sldId="304"/>
+        </pc:sldMkLst>
+        <pc:spChg chg="mod">
+          <ac:chgData name="Harrison Terry" userId="63d32b2a3de92b0b" providerId="LiveId" clId="{5DF33DE7-60B6-4EB2-8509-B6307F7E2722}" dt="2021-02-23T18:08:49.030" v="87" actId="27636"/>
+          <ac:spMkLst>
+            <pc:docMk/>
+            <pc:sldMk cId="3401748718" sldId="304"/>
+            <ac:spMk id="31" creationId="{97AB1F14-3A1E-4057-A473-9975BA59F012}"/>
+          </ac:spMkLst>
+        </pc:spChg>
+      </pc:sldChg>
+      <pc:sldChg chg="modSp mod">
+        <pc:chgData name="Harrison Terry" userId="63d32b2a3de92b0b" providerId="LiveId" clId="{5DF33DE7-60B6-4EB2-8509-B6307F7E2722}" dt="2021-02-23T18:09:02.735" v="98" actId="20577"/>
+        <pc:sldMkLst>
+          <pc:docMk/>
+          <pc:sldMk cId="4017832845" sldId="343"/>
+        </pc:sldMkLst>
+        <pc:spChg chg="mod">
+          <ac:chgData name="Harrison Terry" userId="63d32b2a3de92b0b" providerId="LiveId" clId="{5DF33DE7-60B6-4EB2-8509-B6307F7E2722}" dt="2021-02-23T18:09:02.735" v="98" actId="20577"/>
+          <ac:spMkLst>
+            <pc:docMk/>
+            <pc:sldMk cId="4017832845" sldId="343"/>
+            <ac:spMk id="3" creationId="{0EC737E2-1EBF-6244-8E0A-274D170CCCE9}"/>
+          </ac:spMkLst>
+        </pc:spChg>
+      </pc:sldChg>
+      <pc:sldChg chg="addSp delSp modSp mod">
+        <pc:chgData name="Harrison Terry" userId="63d32b2a3de92b0b" providerId="LiveId" clId="{5DF33DE7-60B6-4EB2-8509-B6307F7E2722}" dt="2021-02-23T18:17:27.734" v="352" actId="20577"/>
+        <pc:sldMkLst>
+          <pc:docMk/>
+          <pc:sldMk cId="1896093534" sldId="344"/>
+        </pc:sldMkLst>
+        <pc:spChg chg="mod">
+          <ac:chgData name="Harrison Terry" userId="63d32b2a3de92b0b" providerId="LiveId" clId="{5DF33DE7-60B6-4EB2-8509-B6307F7E2722}" dt="2021-02-23T18:17:27.734" v="352" actId="20577"/>
+          <ac:spMkLst>
+            <pc:docMk/>
+            <pc:sldMk cId="1896093534" sldId="344"/>
+            <ac:spMk id="3" creationId="{0EC737E2-1EBF-6244-8E0A-274D170CCCE9}"/>
+          </ac:spMkLst>
+        </pc:spChg>
+        <pc:graphicFrameChg chg="add del mod modGraphic">
+          <ac:chgData name="Harrison Terry" userId="63d32b2a3de92b0b" providerId="LiveId" clId="{5DF33DE7-60B6-4EB2-8509-B6307F7E2722}" dt="2021-02-23T18:16:14.789" v="341"/>
+          <ac:graphicFrameMkLst>
+            <pc:docMk/>
+            <pc:sldMk cId="1896093534" sldId="344"/>
+            <ac:graphicFrameMk id="7" creationId="{7FBB48F3-8DEF-477A-B911-2D522A45BB53}"/>
+          </ac:graphicFrameMkLst>
+        </pc:graphicFrameChg>
+        <pc:graphicFrameChg chg="add mod modGraphic">
+          <ac:chgData name="Harrison Terry" userId="63d32b2a3de92b0b" providerId="LiveId" clId="{5DF33DE7-60B6-4EB2-8509-B6307F7E2722}" dt="2021-02-23T18:17:09.164" v="346" actId="1076"/>
+          <ac:graphicFrameMkLst>
+            <pc:docMk/>
+            <pc:sldMk cId="1896093534" sldId="344"/>
+            <ac:graphicFrameMk id="8" creationId="{787DAB74-6983-40C1-8859-A5642780922E}"/>
+          </ac:graphicFrameMkLst>
+        </pc:graphicFrameChg>
+        <pc:picChg chg="del mod">
+          <ac:chgData name="Harrison Terry" userId="63d32b2a3de92b0b" providerId="LiveId" clId="{5DF33DE7-60B6-4EB2-8509-B6307F7E2722}" dt="2021-02-23T18:13:43.216" v="335" actId="478"/>
+          <ac:picMkLst>
+            <pc:docMk/>
+            <pc:sldMk cId="1896093534" sldId="344"/>
+            <ac:picMk id="9" creationId="{C1585DD3-F853-4605-9B5C-852E42A42BA7}"/>
+          </ac:picMkLst>
+        </pc:picChg>
+      </pc:sldChg>
+      <pc:sldChg chg="modSp mod">
+        <pc:chgData name="Harrison Terry" userId="63d32b2a3de92b0b" providerId="LiveId" clId="{5DF33DE7-60B6-4EB2-8509-B6307F7E2722}" dt="2021-02-23T18:19:27.551" v="434" actId="20577"/>
+        <pc:sldMkLst>
+          <pc:docMk/>
+          <pc:sldMk cId="1221890367" sldId="353"/>
+        </pc:sldMkLst>
+        <pc:spChg chg="mod">
+          <ac:chgData name="Harrison Terry" userId="63d32b2a3de92b0b" providerId="LiveId" clId="{5DF33DE7-60B6-4EB2-8509-B6307F7E2722}" dt="2021-02-23T18:19:27.551" v="434" actId="20577"/>
+          <ac:spMkLst>
+            <pc:docMk/>
+            <pc:sldMk cId="1221890367" sldId="353"/>
+            <ac:spMk id="3" creationId="{0EC737E2-1EBF-6244-8E0A-274D170CCCE9}"/>
+          </ac:spMkLst>
+        </pc:spChg>
+      </pc:sldChg>
+    </pc:docChg>
+  </pc:docChgLst>
+</pc:chgInfo>
 </file>
 
 <file path=ppt/charts/chart1.xml><?xml version="1.0" encoding="utf-8"?>
@@ -5308,7 +5429,7 @@
           <a:p>
             <a:fld id="{464227E5-0005-4204-A4E7-B4896A8A2468}" type="datetimeFigureOut">
               <a:rPr lang="en-US" smtClean="0"/>
-              <a:t>2/18/2021</a:t>
+              <a:t>2/23/2021</a:t>
             </a:fld>
             <a:endParaRPr lang="en-US" dirty="0"/>
           </a:p>
@@ -5890,7 +6011,7 @@
           <a:p>
             <a:fld id="{C05E4F18-B0D9-4662-BC27-BFA37F71E5A9}" type="datetimeFigureOut">
               <a:rPr lang="en-US" smtClean="0"/>
-              <a:t>2/18/2021</a:t>
+              <a:t>2/23/2021</a:t>
             </a:fld>
             <a:endParaRPr lang="en-US" dirty="0"/>
           </a:p>
@@ -6088,7 +6209,7 @@
           <a:p>
             <a:fld id="{C05E4F18-B0D9-4662-BC27-BFA37F71E5A9}" type="datetimeFigureOut">
               <a:rPr lang="en-US" smtClean="0"/>
-              <a:t>2/18/2021</a:t>
+              <a:t>2/23/2021</a:t>
             </a:fld>
             <a:endParaRPr lang="en-US" dirty="0"/>
           </a:p>
@@ -6296,7 +6417,7 @@
           <a:p>
             <a:fld id="{C05E4F18-B0D9-4662-BC27-BFA37F71E5A9}" type="datetimeFigureOut">
               <a:rPr lang="en-US" smtClean="0"/>
-              <a:t>2/18/2021</a:t>
+              <a:t>2/23/2021</a:t>
             </a:fld>
             <a:endParaRPr lang="en-US" dirty="0"/>
           </a:p>
@@ -9275,7 +9396,7 @@
           <a:p>
             <a:fld id="{C05E4F18-B0D9-4662-BC27-BFA37F71E5A9}" type="datetimeFigureOut">
               <a:rPr lang="en-US" smtClean="0"/>
-              <a:t>2/18/2021</a:t>
+              <a:t>2/23/2021</a:t>
             </a:fld>
             <a:endParaRPr lang="en-US" dirty="0"/>
           </a:p>
@@ -9550,7 +9671,7 @@
           <a:p>
             <a:fld id="{C05E4F18-B0D9-4662-BC27-BFA37F71E5A9}" type="datetimeFigureOut">
               <a:rPr lang="en-US" smtClean="0"/>
-              <a:t>2/18/2021</a:t>
+              <a:t>2/23/2021</a:t>
             </a:fld>
             <a:endParaRPr lang="en-US" dirty="0"/>
           </a:p>
@@ -9815,7 +9936,7 @@
           <a:p>
             <a:fld id="{C05E4F18-B0D9-4662-BC27-BFA37F71E5A9}" type="datetimeFigureOut">
               <a:rPr lang="en-US" smtClean="0"/>
-              <a:t>2/18/2021</a:t>
+              <a:t>2/23/2021</a:t>
             </a:fld>
             <a:endParaRPr lang="en-US" dirty="0"/>
           </a:p>
@@ -10227,7 +10348,7 @@
           <a:p>
             <a:fld id="{C05E4F18-B0D9-4662-BC27-BFA37F71E5A9}" type="datetimeFigureOut">
               <a:rPr lang="en-US" smtClean="0"/>
-              <a:t>2/18/2021</a:t>
+              <a:t>2/23/2021</a:t>
             </a:fld>
             <a:endParaRPr lang="en-US" dirty="0"/>
           </a:p>
@@ -10368,7 +10489,7 @@
           <a:p>
             <a:fld id="{C05E4F18-B0D9-4662-BC27-BFA37F71E5A9}" type="datetimeFigureOut">
               <a:rPr lang="en-US" smtClean="0"/>
-              <a:t>2/18/2021</a:t>
+              <a:t>2/23/2021</a:t>
             </a:fld>
             <a:endParaRPr lang="en-US" dirty="0"/>
           </a:p>
@@ -10481,7 +10602,7 @@
           <a:p>
             <a:fld id="{C05E4F18-B0D9-4662-BC27-BFA37F71E5A9}" type="datetimeFigureOut">
               <a:rPr lang="en-US" smtClean="0"/>
-              <a:t>2/18/2021</a:t>
+              <a:t>2/23/2021</a:t>
             </a:fld>
             <a:endParaRPr lang="en-US" dirty="0"/>
           </a:p>
@@ -10792,7 +10913,7 @@
           <a:p>
             <a:fld id="{C05E4F18-B0D9-4662-BC27-BFA37F71E5A9}" type="datetimeFigureOut">
               <a:rPr lang="en-US" smtClean="0"/>
-              <a:t>2/18/2021</a:t>
+              <a:t>2/23/2021</a:t>
             </a:fld>
             <a:endParaRPr lang="en-US" dirty="0"/>
           </a:p>
@@ -11080,7 +11201,7 @@
           <a:p>
             <a:fld id="{C05E4F18-B0D9-4662-BC27-BFA37F71E5A9}" type="datetimeFigureOut">
               <a:rPr lang="en-US" smtClean="0"/>
-              <a:t>2/18/2021</a:t>
+              <a:t>2/23/2021</a:t>
             </a:fld>
             <a:endParaRPr lang="en-US" dirty="0"/>
           </a:p>
@@ -11321,7 +11442,7 @@
           <a:p>
             <a:fld id="{C05E4F18-B0D9-4662-BC27-BFA37F71E5A9}" type="datetimeFigureOut">
               <a:rPr lang="en-US" smtClean="0"/>
-              <a:t>2/18/2021</a:t>
+              <a:t>2/23/2021</a:t>
             </a:fld>
             <a:endParaRPr lang="en-US" dirty="0"/>
           </a:p>
@@ -11911,7 +12032,23 @@
                   <a:srgbClr val="FFFFFF"/>
                 </a:solidFill>
               </a:rPr>
-              <a:t>311 Data Cold Season – Pre Covid</a:t>
+              <a:t>311 Analysis of Pre-</a:t>
+            </a:r>
+            <a:r>
+              <a:rPr lang="en-US" sz="8000" dirty="0" err="1">
+                <a:solidFill>
+                  <a:srgbClr val="FFFFFF"/>
+                </a:solidFill>
+              </a:rPr>
+              <a:t>Covid</a:t>
+            </a:r>
+            <a:r>
+              <a:rPr lang="en-US" sz="8000" dirty="0">
+                <a:solidFill>
+                  <a:srgbClr val="FFFFFF"/>
+                </a:solidFill>
+              </a:rPr>
+              <a:t> Winter Data</a:t>
             </a:r>
           </a:p>
         </p:txBody>
@@ -14768,13 +14905,13 @@
         </p:nvSpPr>
         <p:spPr>
           <a:xfrm>
-            <a:off x="3678716" y="3084688"/>
-            <a:ext cx="2133504" cy="593008"/>
+            <a:off x="3678716" y="3084687"/>
+            <a:ext cx="2133504" cy="759811"/>
           </a:xfrm>
         </p:spPr>
         <p:txBody>
           <a:bodyPr>
-            <a:normAutofit fontScale="92500" lnSpcReduction="10000"/>
+            <a:normAutofit fontScale="92500" lnSpcReduction="20000"/>
           </a:bodyPr>
           <a:lstStyle/>
           <a:p>
@@ -14786,7 +14923,7 @@
           <a:p>
             <a:r>
               <a:rPr lang="en-US" dirty="0"/>
-              <a:t>Id:</a:t>
+              <a:t>Mechanical Engineering and Math Major</a:t>
             </a:r>
           </a:p>
         </p:txBody>
@@ -15363,7 +15500,7 @@
             </a:pPr>
             <a:r>
               <a:rPr lang="en-US" sz="2000" dirty="0"/>
-              <a:t>311 is similar to 911 but for non-emergencies</a:t>
+              <a:t>311 calls are similar to 911 but for non-emergencies</a:t>
             </a:r>
           </a:p>
           <a:p>
@@ -15737,7 +15874,12 @@
             <p:ph sz="half" idx="1"/>
           </p:nvPr>
         </p:nvSpPr>
-        <p:spPr/>
+        <p:spPr>
+          <a:xfrm>
+            <a:off x="1021080" y="2286003"/>
+            <a:ext cx="4876800" cy="3568696"/>
+          </a:xfrm>
+        </p:spPr>
         <p:txBody>
           <a:bodyPr/>
           <a:lstStyle/>
@@ -15785,7 +15927,7 @@
             </a:pPr>
             <a:r>
               <a:rPr lang="en-US" dirty="0"/>
-              <a:t>We have data coming across the KC MO area including: Jackson, Clay, Platte, and Cass Counties</a:t>
+              <a:t>Data comes from the KCMO region including the following counties: Jackson, Clay, Platte, and Cass</a:t>
             </a:r>
           </a:p>
           <a:p>
@@ -15810,7 +15952,15 @@
             </a:pPr>
             <a:r>
               <a:rPr lang="en-US" dirty="0"/>
-              <a:t>Our dataset has several categories that need to be analyzed to identify intra and extra-group differences</a:t>
+              <a:t>Dataset includes several groups such as Trash removal, potholes, lost animals, </a:t>
+            </a:r>
+            <a:r>
+              <a:rPr lang="en-US" dirty="0" err="1"/>
+              <a:t>etc</a:t>
+            </a:r>
+            <a:r>
+              <a:rPr lang="en-US" dirty="0"/>
+              <a:t> (shown right) that need to be analyzed to see what variables affect issue resolution.</a:t>
             </a:r>
           </a:p>
           <a:p>
@@ -15967,36 +16117,289 @@
           </a:p>
         </p:txBody>
       </p:sp>
-      <p:pic>
-        <p:nvPicPr>
-          <p:cNvPr id="9" name="Picture 8">
-            <a:extLst>
-              <a:ext uri="{FF2B5EF4-FFF2-40B4-BE49-F238E27FC236}">
-                <a16:creationId xmlns:a16="http://schemas.microsoft.com/office/drawing/2014/main" id="{C1585DD3-F853-4605-9B5C-852E42A42BA7}"/>
-              </a:ext>
-            </a:extLst>
-          </p:cNvPr>
-          <p:cNvPicPr>
-            <a:picLocks noChangeAspect="1"/>
-          </p:cNvPicPr>
-          <p:nvPr/>
-        </p:nvPicPr>
-        <p:blipFill>
-          <a:blip r:embed="rId2"/>
-          <a:stretch>
-            <a:fillRect/>
-          </a:stretch>
-        </p:blipFill>
-        <p:spPr>
-          <a:xfrm>
-            <a:off x="6281061" y="2150042"/>
-            <a:ext cx="5497025" cy="1920309"/>
-          </a:xfrm>
-          <a:prstGeom prst="rect">
-            <a:avLst/>
-          </a:prstGeom>
-        </p:spPr>
-      </p:pic>
+      <p:graphicFrame>
+        <p:nvGraphicFramePr>
+          <p:cNvPr id="8" name="Table 7">
+            <a:extLst>
+              <a:ext uri="{FF2B5EF4-FFF2-40B4-BE49-F238E27FC236}">
+                <a16:creationId xmlns:a16="http://schemas.microsoft.com/office/drawing/2014/main" id="{787DAB74-6983-40C1-8859-A5642780922E}"/>
+              </a:ext>
+            </a:extLst>
+          </p:cNvPr>
+          <p:cNvGraphicFramePr>
+            <a:graphicFrameLocks noGrp="1"/>
+          </p:cNvGraphicFramePr>
+          <p:nvPr>
+            <p:extLst>
+              <p:ext uri="{D42A27DB-BD31-4B8C-83A1-F6EECF244321}">
+                <p14:modId xmlns:p14="http://schemas.microsoft.com/office/powerpoint/2010/main" val="2255116549"/>
+              </p:ext>
+            </p:extLst>
+          </p:nvPr>
+        </p:nvGraphicFramePr>
+        <p:xfrm>
+          <a:off x="6015355" y="1840737"/>
+          <a:ext cx="5684520" cy="3176525"/>
+        </p:xfrm>
+        <a:graphic>
+          <a:graphicData uri="http://schemas.openxmlformats.org/drawingml/2006/table">
+            <a:tbl>
+              <a:tblPr>
+                <a:tableStyleId>{5C22544A-7EE6-4342-B048-85BDC9FD1C3A}</a:tableStyleId>
+              </a:tblPr>
+              <a:tblGrid>
+                <a:gridCol w="5684520">
+                  <a:extLst>
+                    <a:ext uri="{9D8B030D-6E8A-4147-A177-3AD203B41FA5}">
+                      <a16:colId xmlns:a16="http://schemas.microsoft.com/office/drawing/2014/main" val="1723040464"/>
+                    </a:ext>
+                  </a:extLst>
+                </a:gridCol>
+              </a:tblGrid>
+              <a:tr h="380817">
+                <a:tc>
+                  <a:txBody>
+                    <a:bodyPr/>
+                    <a:lstStyle/>
+                    <a:p>
+                      <a:pPr algn="l" fontAlgn="b"/>
+                      <a:r>
+                        <a:rPr lang="en-US" sz="1600" u="none" strike="noStrike" dirty="0">
+                          <a:effectLst/>
+                        </a:rPr>
+                        <a:t>Categories</a:t>
+                      </a:r>
+                      <a:endParaRPr lang="en-US" sz="1600" b="0" i="0" u="none" strike="noStrike" dirty="0">
+                        <a:solidFill>
+                          <a:srgbClr val="000000"/>
+                        </a:solidFill>
+                        <a:effectLst/>
+                        <a:latin typeface="Calibri" panose="020F0502020204030204" pitchFamily="34" charset="0"/>
+                      </a:endParaRPr>
+                    </a:p>
+                  </a:txBody>
+                  <a:tcPr marL="9525" marR="9525" marT="9525" marB="0" anchor="b"/>
+                </a:tc>
+                <a:extLst>
+                  <a:ext uri="{0D108BD9-81ED-4DB2-BD59-A6C34878D82A}">
+                    <a16:rowId xmlns:a16="http://schemas.microsoft.com/office/drawing/2014/main" val="3924176772"/>
+                  </a:ext>
+                </a:extLst>
+              </a:tr>
+              <a:tr h="380817">
+                <a:tc>
+                  <a:txBody>
+                    <a:bodyPr/>
+                    <a:lstStyle/>
+                    <a:p>
+                      <a:pPr algn="l" fontAlgn="b"/>
+                      <a:r>
+                        <a:rPr lang="en-US" sz="1600" u="none" strike="noStrike">
+                          <a:effectLst/>
+                        </a:rPr>
+                        <a:t>Animals / Pets</a:t>
+                      </a:r>
+                      <a:endParaRPr lang="en-US" sz="1600" b="0" i="0" u="none" strike="noStrike">
+                        <a:solidFill>
+                          <a:srgbClr val="000000"/>
+                        </a:solidFill>
+                        <a:effectLst/>
+                        <a:latin typeface="Calibri" panose="020F0502020204030204" pitchFamily="34" charset="0"/>
+                      </a:endParaRPr>
+                    </a:p>
+                  </a:txBody>
+                  <a:tcPr marL="9525" marR="9525" marT="9525" marB="0" anchor="b"/>
+                </a:tc>
+                <a:extLst>
+                  <a:ext uri="{0D108BD9-81ED-4DB2-BD59-A6C34878D82A}">
+                    <a16:rowId xmlns:a16="http://schemas.microsoft.com/office/drawing/2014/main" val="3673089178"/>
+                  </a:ext>
+                </a:extLst>
+              </a:tr>
+              <a:tr h="380817">
+                <a:tc>
+                  <a:txBody>
+                    <a:bodyPr/>
+                    <a:lstStyle/>
+                    <a:p>
+                      <a:pPr algn="l" fontAlgn="b"/>
+                      <a:r>
+                        <a:rPr lang="en-US" sz="1600" u="none" strike="noStrike">
+                          <a:effectLst/>
+                        </a:rPr>
+                        <a:t>Lights / Signals, Signs, Sidewalks / Curbs / Ditch, Streets / Roadways / Alleys</a:t>
+                      </a:r>
+                      <a:endParaRPr lang="en-US" sz="1600" b="0" i="0" u="none" strike="noStrike">
+                        <a:solidFill>
+                          <a:srgbClr val="000000"/>
+                        </a:solidFill>
+                        <a:effectLst/>
+                        <a:latin typeface="Calibri" panose="020F0502020204030204" pitchFamily="34" charset="0"/>
+                      </a:endParaRPr>
+                    </a:p>
+                  </a:txBody>
+                  <a:tcPr marL="9525" marR="9525" marT="9525" marB="0" anchor="b"/>
+                </a:tc>
+                <a:extLst>
+                  <a:ext uri="{0D108BD9-81ED-4DB2-BD59-A6C34878D82A}">
+                    <a16:rowId xmlns:a16="http://schemas.microsoft.com/office/drawing/2014/main" val="176127323"/>
+                  </a:ext>
+                </a:extLst>
+              </a:tr>
+              <a:tr h="380817">
+                <a:tc>
+                  <a:txBody>
+                    <a:bodyPr/>
+                    <a:lstStyle/>
+                    <a:p>
+                      <a:pPr algn="l" fontAlgn="b"/>
+                      <a:r>
+                        <a:rPr lang="en-US" sz="1600" u="none" strike="noStrike">
+                          <a:effectLst/>
+                        </a:rPr>
+                        <a:t>Property / Buildings / Construction</a:t>
+                      </a:r>
+                      <a:endParaRPr lang="en-US" sz="1600" b="0" i="0" u="none" strike="noStrike">
+                        <a:solidFill>
+                          <a:srgbClr val="000000"/>
+                        </a:solidFill>
+                        <a:effectLst/>
+                        <a:latin typeface="Calibri" panose="020F0502020204030204" pitchFamily="34" charset="0"/>
+                      </a:endParaRPr>
+                    </a:p>
+                  </a:txBody>
+                  <a:tcPr marL="9525" marR="9525" marT="9525" marB="0" anchor="b"/>
+                </a:tc>
+                <a:extLst>
+                  <a:ext uri="{0D108BD9-81ED-4DB2-BD59-A6C34878D82A}">
+                    <a16:rowId xmlns:a16="http://schemas.microsoft.com/office/drawing/2014/main" val="135530371"/>
+                  </a:ext>
+                </a:extLst>
+              </a:tr>
+              <a:tr h="380817">
+                <a:tc>
+                  <a:txBody>
+                    <a:bodyPr/>
+                    <a:lstStyle/>
+                    <a:p>
+                      <a:pPr algn="l" fontAlgn="b"/>
+                      <a:r>
+                        <a:rPr lang="en-US" sz="1600" u="none" strike="noStrike">
+                          <a:effectLst/>
+                        </a:rPr>
+                        <a:t>Public Health</a:t>
+                      </a:r>
+                      <a:endParaRPr lang="en-US" sz="1600" b="0" i="0" u="none" strike="noStrike">
+                        <a:solidFill>
+                          <a:srgbClr val="000000"/>
+                        </a:solidFill>
+                        <a:effectLst/>
+                        <a:latin typeface="Calibri" panose="020F0502020204030204" pitchFamily="34" charset="0"/>
+                      </a:endParaRPr>
+                    </a:p>
+                  </a:txBody>
+                  <a:tcPr marL="9525" marR="9525" marT="9525" marB="0" anchor="b"/>
+                </a:tc>
+                <a:extLst>
+                  <a:ext uri="{0D108BD9-81ED-4DB2-BD59-A6C34878D82A}">
+                    <a16:rowId xmlns:a16="http://schemas.microsoft.com/office/drawing/2014/main" val="1462264636"/>
+                  </a:ext>
+                </a:extLst>
+              </a:tr>
+              <a:tr h="380817">
+                <a:tc>
+                  <a:txBody>
+                    <a:bodyPr/>
+                    <a:lstStyle/>
+                    <a:p>
+                      <a:pPr algn="l" fontAlgn="b"/>
+                      <a:r>
+                        <a:rPr lang="en-US" sz="1600" u="none" strike="noStrike">
+                          <a:effectLst/>
+                        </a:rPr>
+                        <a:t>Storm Water / Sewer</a:t>
+                      </a:r>
+                      <a:endParaRPr lang="en-US" sz="1600" b="0" i="0" u="none" strike="noStrike">
+                        <a:solidFill>
+                          <a:srgbClr val="000000"/>
+                        </a:solidFill>
+                        <a:effectLst/>
+                        <a:latin typeface="Calibri" panose="020F0502020204030204" pitchFamily="34" charset="0"/>
+                      </a:endParaRPr>
+                    </a:p>
+                  </a:txBody>
+                  <a:tcPr marL="9525" marR="9525" marT="9525" marB="0" anchor="b"/>
+                </a:tc>
+                <a:extLst>
+                  <a:ext uri="{0D108BD9-81ED-4DB2-BD59-A6C34878D82A}">
+                    <a16:rowId xmlns:a16="http://schemas.microsoft.com/office/drawing/2014/main" val="1476676422"/>
+                  </a:ext>
+                </a:extLst>
+              </a:tr>
+              <a:tr h="380817">
+                <a:tc>
+                  <a:txBody>
+                    <a:bodyPr/>
+                    <a:lstStyle/>
+                    <a:p>
+                      <a:pPr algn="l" fontAlgn="b"/>
+                      <a:r>
+                        <a:rPr lang="en-US" sz="1600" u="none" strike="noStrike" dirty="0">
+                          <a:effectLst/>
+                        </a:rPr>
+                        <a:t>Trash / Recycling</a:t>
+                      </a:r>
+                      <a:endParaRPr lang="en-US" sz="1600" b="0" i="0" u="none" strike="noStrike" dirty="0">
+                        <a:solidFill>
+                          <a:srgbClr val="000000"/>
+                        </a:solidFill>
+                        <a:effectLst/>
+                        <a:latin typeface="Calibri" panose="020F0502020204030204" pitchFamily="34" charset="0"/>
+                      </a:endParaRPr>
+                    </a:p>
+                  </a:txBody>
+                  <a:tcPr marL="9525" marR="9525" marT="9525" marB="0" anchor="b"/>
+                </a:tc>
+                <a:extLst>
+                  <a:ext uri="{0D108BD9-81ED-4DB2-BD59-A6C34878D82A}">
+                    <a16:rowId xmlns:a16="http://schemas.microsoft.com/office/drawing/2014/main" val="3788766334"/>
+                  </a:ext>
+                </a:extLst>
+              </a:tr>
+              <a:tr h="394418">
+                <a:tc>
+                  <a:txBody>
+                    <a:bodyPr/>
+                    <a:lstStyle/>
+                    <a:p>
+                      <a:pPr algn="l" fontAlgn="b"/>
+                      <a:r>
+                        <a:rPr lang="en-US" sz="1600" u="none" strike="noStrike" dirty="0">
+                          <a:effectLst/>
+                        </a:rPr>
+                        <a:t>Public Safety</a:t>
+                      </a:r>
+                      <a:endParaRPr lang="en-US" sz="1600" b="0" i="0" u="none" strike="noStrike" dirty="0">
+                        <a:solidFill>
+                          <a:srgbClr val="000000"/>
+                        </a:solidFill>
+                        <a:effectLst/>
+                        <a:latin typeface="Calibri" panose="020F0502020204030204" pitchFamily="34" charset="0"/>
+                      </a:endParaRPr>
+                    </a:p>
+                  </a:txBody>
+                  <a:tcPr marL="9525" marR="9525" marT="9525" marB="0" anchor="b"/>
+                </a:tc>
+                <a:extLst>
+                  <a:ext uri="{0D108BD9-81ED-4DB2-BD59-A6C34878D82A}">
+                    <a16:rowId xmlns:a16="http://schemas.microsoft.com/office/drawing/2014/main" val="525444143"/>
+                  </a:ext>
+                </a:extLst>
+              </a:tr>
+            </a:tbl>
+          </a:graphicData>
+        </a:graphic>
+      </p:graphicFrame>
     </p:spTree>
     <p:extLst>
       <p:ext uri="{BB962C8B-B14F-4D97-AF65-F5344CB8AC3E}">
@@ -16090,7 +16493,7 @@
             </a:pPr>
             <a:r>
               <a:rPr lang="en-US" dirty="0"/>
-              <a:t>Does average service completion time change based on neighborhood income?</a:t>
+              <a:t>Does issue resolution time depend upon neighborhood income?</a:t>
             </a:r>
           </a:p>
           <a:p>

</xml_diff>